<commit_message>
[GT-50] Welcome 이미지 생성 (splash.bmp) http://jira.iitp.cubrid.org/browse/GT-50
- Welcome Image 수정
</commit_message>
<xml_diff>
--- a/ViT_docs/create_image/splash_welcome.pptx
+++ b/ViT_docs/create_image/splash_welcome.pptx
@@ -104,6 +104,11 @@
       </a:defRPr>
     </a:lvl9pPr>
   </p:defaultTextStyle>
+  <p:extLst>
+    <p:ext uri="{EFAFB233-063F-42B5-8137-9DF3F51BA10A}">
+      <p15:sldGuideLst xmlns:p15="http://schemas.microsoft.com/office/powerpoint/2012/main"/>
+    </p:ext>
+  </p:extLst>
 </p:presentation>
 </file>
 
@@ -254,7 +259,7 @@
           <a:p>
             <a:fld id="{D92AEBF4-0616-440A-AC5D-228FBF13DCDE}" type="datetimeFigureOut">
               <a:rPr lang="ko-KR" altLang="en-US" smtClean="0"/>
-              <a:t>2022-12-09</a:t>
+              <a:t>2022-12-16</a:t>
             </a:fld>
             <a:endParaRPr lang="ko-KR" altLang="en-US"/>
           </a:p>
@@ -452,7 +457,7 @@
           <a:p>
             <a:fld id="{D92AEBF4-0616-440A-AC5D-228FBF13DCDE}" type="datetimeFigureOut">
               <a:rPr lang="ko-KR" altLang="en-US" smtClean="0"/>
-              <a:t>2022-12-09</a:t>
+              <a:t>2022-12-16</a:t>
             </a:fld>
             <a:endParaRPr lang="ko-KR" altLang="en-US"/>
           </a:p>
@@ -660,7 +665,7 @@
           <a:p>
             <a:fld id="{D92AEBF4-0616-440A-AC5D-228FBF13DCDE}" type="datetimeFigureOut">
               <a:rPr lang="ko-KR" altLang="en-US" smtClean="0"/>
-              <a:t>2022-12-09</a:t>
+              <a:t>2022-12-16</a:t>
             </a:fld>
             <a:endParaRPr lang="ko-KR" altLang="en-US"/>
           </a:p>
@@ -858,7 +863,7 @@
           <a:p>
             <a:fld id="{D92AEBF4-0616-440A-AC5D-228FBF13DCDE}" type="datetimeFigureOut">
               <a:rPr lang="ko-KR" altLang="en-US" smtClean="0"/>
-              <a:t>2022-12-09</a:t>
+              <a:t>2022-12-16</a:t>
             </a:fld>
             <a:endParaRPr lang="ko-KR" altLang="en-US"/>
           </a:p>
@@ -1133,7 +1138,7 @@
           <a:p>
             <a:fld id="{D92AEBF4-0616-440A-AC5D-228FBF13DCDE}" type="datetimeFigureOut">
               <a:rPr lang="ko-KR" altLang="en-US" smtClean="0"/>
-              <a:t>2022-12-09</a:t>
+              <a:t>2022-12-16</a:t>
             </a:fld>
             <a:endParaRPr lang="ko-KR" altLang="en-US"/>
           </a:p>
@@ -1398,7 +1403,7 @@
           <a:p>
             <a:fld id="{D92AEBF4-0616-440A-AC5D-228FBF13DCDE}" type="datetimeFigureOut">
               <a:rPr lang="ko-KR" altLang="en-US" smtClean="0"/>
-              <a:t>2022-12-09</a:t>
+              <a:t>2022-12-16</a:t>
             </a:fld>
             <a:endParaRPr lang="ko-KR" altLang="en-US"/>
           </a:p>
@@ -1810,7 +1815,7 @@
           <a:p>
             <a:fld id="{D92AEBF4-0616-440A-AC5D-228FBF13DCDE}" type="datetimeFigureOut">
               <a:rPr lang="ko-KR" altLang="en-US" smtClean="0"/>
-              <a:t>2022-12-09</a:t>
+              <a:t>2022-12-16</a:t>
             </a:fld>
             <a:endParaRPr lang="ko-KR" altLang="en-US"/>
           </a:p>
@@ -1951,7 +1956,7 @@
           <a:p>
             <a:fld id="{D92AEBF4-0616-440A-AC5D-228FBF13DCDE}" type="datetimeFigureOut">
               <a:rPr lang="ko-KR" altLang="en-US" smtClean="0"/>
-              <a:t>2022-12-09</a:t>
+              <a:t>2022-12-16</a:t>
             </a:fld>
             <a:endParaRPr lang="ko-KR" altLang="en-US"/>
           </a:p>
@@ -2064,7 +2069,7 @@
           <a:p>
             <a:fld id="{D92AEBF4-0616-440A-AC5D-228FBF13DCDE}" type="datetimeFigureOut">
               <a:rPr lang="ko-KR" altLang="en-US" smtClean="0"/>
-              <a:t>2022-12-09</a:t>
+              <a:t>2022-12-16</a:t>
             </a:fld>
             <a:endParaRPr lang="ko-KR" altLang="en-US"/>
           </a:p>
@@ -2375,7 +2380,7 @@
           <a:p>
             <a:fld id="{D92AEBF4-0616-440A-AC5D-228FBF13DCDE}" type="datetimeFigureOut">
               <a:rPr lang="ko-KR" altLang="en-US" smtClean="0"/>
-              <a:t>2022-12-09</a:t>
+              <a:t>2022-12-16</a:t>
             </a:fld>
             <a:endParaRPr lang="ko-KR" altLang="en-US"/>
           </a:p>
@@ -2663,7 +2668,7 @@
           <a:p>
             <a:fld id="{D92AEBF4-0616-440A-AC5D-228FBF13DCDE}" type="datetimeFigureOut">
               <a:rPr lang="ko-KR" altLang="en-US" smtClean="0"/>
-              <a:t>2022-12-09</a:t>
+              <a:t>2022-12-16</a:t>
             </a:fld>
             <a:endParaRPr lang="ko-KR" altLang="en-US"/>
           </a:p>
@@ -2904,7 +2909,7 @@
           <a:p>
             <a:fld id="{D92AEBF4-0616-440A-AC5D-228FBF13DCDE}" type="datetimeFigureOut">
               <a:rPr lang="ko-KR" altLang="en-US" smtClean="0"/>
-              <a:t>2022-12-09</a:t>
+              <a:t>2022-12-16</a:t>
             </a:fld>
             <a:endParaRPr lang="ko-KR" altLang="en-US"/>
           </a:p>
@@ -3426,8 +3431,8 @@
         </p:nvSpPr>
         <p:spPr>
           <a:xfrm>
-            <a:off x="5206678" y="2146766"/>
-            <a:ext cx="3577104" cy="400110"/>
+            <a:off x="6022599" y="2146766"/>
+            <a:ext cx="2516485" cy="400110"/>
           </a:xfrm>
           <a:prstGeom prst="rect">
             <a:avLst/>
@@ -3461,7 +3466,7 @@
           <a:p>
             <a:r>
               <a:rPr lang="en-US" altLang="ko-KR" sz="2000" dirty="0"/>
-              <a:t>DBeaver For TurboGraph++</a:t>
+              <a:t>For TurboGraph++</a:t>
             </a:r>
             <a:endParaRPr lang="ko-KR" altLang="en-US" sz="2000" dirty="0"/>
           </a:p>

</xml_diff>

<commit_message>
[GT-50] Welcome 이미지 생성 (splash.bmp) (#61)
http://jira.iitp.cubrid.org/browse/GT-50

- Welcome Image 수정
</commit_message>
<xml_diff>
--- a/ViT_docs/create_image/splash_welcome.pptx
+++ b/ViT_docs/create_image/splash_welcome.pptx
@@ -104,6 +104,11 @@
       </a:defRPr>
     </a:lvl9pPr>
   </p:defaultTextStyle>
+  <p:extLst>
+    <p:ext uri="{EFAFB233-063F-42B5-8137-9DF3F51BA10A}">
+      <p15:sldGuideLst xmlns:p15="http://schemas.microsoft.com/office/powerpoint/2012/main"/>
+    </p:ext>
+  </p:extLst>
 </p:presentation>
 </file>
 
@@ -254,7 +259,7 @@
           <a:p>
             <a:fld id="{D92AEBF4-0616-440A-AC5D-228FBF13DCDE}" type="datetimeFigureOut">
               <a:rPr lang="ko-KR" altLang="en-US" smtClean="0"/>
-              <a:t>2022-12-09</a:t>
+              <a:t>2022-12-16</a:t>
             </a:fld>
             <a:endParaRPr lang="ko-KR" altLang="en-US"/>
           </a:p>
@@ -452,7 +457,7 @@
           <a:p>
             <a:fld id="{D92AEBF4-0616-440A-AC5D-228FBF13DCDE}" type="datetimeFigureOut">
               <a:rPr lang="ko-KR" altLang="en-US" smtClean="0"/>
-              <a:t>2022-12-09</a:t>
+              <a:t>2022-12-16</a:t>
             </a:fld>
             <a:endParaRPr lang="ko-KR" altLang="en-US"/>
           </a:p>
@@ -660,7 +665,7 @@
           <a:p>
             <a:fld id="{D92AEBF4-0616-440A-AC5D-228FBF13DCDE}" type="datetimeFigureOut">
               <a:rPr lang="ko-KR" altLang="en-US" smtClean="0"/>
-              <a:t>2022-12-09</a:t>
+              <a:t>2022-12-16</a:t>
             </a:fld>
             <a:endParaRPr lang="ko-KR" altLang="en-US"/>
           </a:p>
@@ -858,7 +863,7 @@
           <a:p>
             <a:fld id="{D92AEBF4-0616-440A-AC5D-228FBF13DCDE}" type="datetimeFigureOut">
               <a:rPr lang="ko-KR" altLang="en-US" smtClean="0"/>
-              <a:t>2022-12-09</a:t>
+              <a:t>2022-12-16</a:t>
             </a:fld>
             <a:endParaRPr lang="ko-KR" altLang="en-US"/>
           </a:p>
@@ -1133,7 +1138,7 @@
           <a:p>
             <a:fld id="{D92AEBF4-0616-440A-AC5D-228FBF13DCDE}" type="datetimeFigureOut">
               <a:rPr lang="ko-KR" altLang="en-US" smtClean="0"/>
-              <a:t>2022-12-09</a:t>
+              <a:t>2022-12-16</a:t>
             </a:fld>
             <a:endParaRPr lang="ko-KR" altLang="en-US"/>
           </a:p>
@@ -1398,7 +1403,7 @@
           <a:p>
             <a:fld id="{D92AEBF4-0616-440A-AC5D-228FBF13DCDE}" type="datetimeFigureOut">
               <a:rPr lang="ko-KR" altLang="en-US" smtClean="0"/>
-              <a:t>2022-12-09</a:t>
+              <a:t>2022-12-16</a:t>
             </a:fld>
             <a:endParaRPr lang="ko-KR" altLang="en-US"/>
           </a:p>
@@ -1810,7 +1815,7 @@
           <a:p>
             <a:fld id="{D92AEBF4-0616-440A-AC5D-228FBF13DCDE}" type="datetimeFigureOut">
               <a:rPr lang="ko-KR" altLang="en-US" smtClean="0"/>
-              <a:t>2022-12-09</a:t>
+              <a:t>2022-12-16</a:t>
             </a:fld>
             <a:endParaRPr lang="ko-KR" altLang="en-US"/>
           </a:p>
@@ -1951,7 +1956,7 @@
           <a:p>
             <a:fld id="{D92AEBF4-0616-440A-AC5D-228FBF13DCDE}" type="datetimeFigureOut">
               <a:rPr lang="ko-KR" altLang="en-US" smtClean="0"/>
-              <a:t>2022-12-09</a:t>
+              <a:t>2022-12-16</a:t>
             </a:fld>
             <a:endParaRPr lang="ko-KR" altLang="en-US"/>
           </a:p>
@@ -2064,7 +2069,7 @@
           <a:p>
             <a:fld id="{D92AEBF4-0616-440A-AC5D-228FBF13DCDE}" type="datetimeFigureOut">
               <a:rPr lang="ko-KR" altLang="en-US" smtClean="0"/>
-              <a:t>2022-12-09</a:t>
+              <a:t>2022-12-16</a:t>
             </a:fld>
             <a:endParaRPr lang="ko-KR" altLang="en-US"/>
           </a:p>
@@ -2375,7 +2380,7 @@
           <a:p>
             <a:fld id="{D92AEBF4-0616-440A-AC5D-228FBF13DCDE}" type="datetimeFigureOut">
               <a:rPr lang="ko-KR" altLang="en-US" smtClean="0"/>
-              <a:t>2022-12-09</a:t>
+              <a:t>2022-12-16</a:t>
             </a:fld>
             <a:endParaRPr lang="ko-KR" altLang="en-US"/>
           </a:p>
@@ -2663,7 +2668,7 @@
           <a:p>
             <a:fld id="{D92AEBF4-0616-440A-AC5D-228FBF13DCDE}" type="datetimeFigureOut">
               <a:rPr lang="ko-KR" altLang="en-US" smtClean="0"/>
-              <a:t>2022-12-09</a:t>
+              <a:t>2022-12-16</a:t>
             </a:fld>
             <a:endParaRPr lang="ko-KR" altLang="en-US"/>
           </a:p>
@@ -2904,7 +2909,7 @@
           <a:p>
             <a:fld id="{D92AEBF4-0616-440A-AC5D-228FBF13DCDE}" type="datetimeFigureOut">
               <a:rPr lang="ko-KR" altLang="en-US" smtClean="0"/>
-              <a:t>2022-12-09</a:t>
+              <a:t>2022-12-16</a:t>
             </a:fld>
             <a:endParaRPr lang="ko-KR" altLang="en-US"/>
           </a:p>
@@ -3426,8 +3431,8 @@
         </p:nvSpPr>
         <p:spPr>
           <a:xfrm>
-            <a:off x="5206678" y="2146766"/>
-            <a:ext cx="3577104" cy="400110"/>
+            <a:off x="6022599" y="2146766"/>
+            <a:ext cx="2516485" cy="400110"/>
           </a:xfrm>
           <a:prstGeom prst="rect">
             <a:avLst/>
@@ -3461,7 +3466,7 @@
           <a:p>
             <a:r>
               <a:rPr lang="en-US" altLang="ko-KR" sz="2000" dirty="0"/>
-              <a:t>DBeaver For TurboGraph++</a:t>
+              <a:t>For TurboGraph++</a:t>
             </a:r>
             <a:endParaRPr lang="ko-KR" altLang="en-US" sz="2000" dirty="0"/>
           </a:p>

</xml_diff>